<commit_message>
Updated slides and examples
</commit_message>
<xml_diff>
--- a/Knockout.pptx
+++ b/Knockout.pptx
@@ -9,9 +9,10 @@
     <p:sldId id="257" r:id="rId3"/>
     <p:sldId id="258" r:id="rId4"/>
     <p:sldId id="262" r:id="rId5"/>
-    <p:sldId id="259" r:id="rId6"/>
-    <p:sldId id="260" r:id="rId7"/>
-    <p:sldId id="261" r:id="rId8"/>
+    <p:sldId id="261" r:id="rId6"/>
+    <p:sldId id="263" r:id="rId7"/>
+    <p:sldId id="259" r:id="rId8"/>
+    <p:sldId id="260" r:id="rId9"/>
   </p:sldIdLst>
   <p:sldSz cx="12192000" cy="6858000"/>
   <p:notesSz cx="6858000" cy="9144000"/>
@@ -4185,7 +4186,7 @@
           <a:p>
             <a:r>
               <a:rPr lang="en-US" dirty="0" smtClean="0"/>
-              <a:t>Knockout.js Pros</a:t>
+              <a:t>Extending KO.js: Custom Bindings</a:t>
             </a:r>
             <a:endParaRPr lang="en-US" dirty="0"/>
           </a:p>
@@ -4208,115 +4209,512 @@
           </a:bodyPr>
           <a:lstStyle/>
           <a:p>
-            <a:pPr>
-              <a:buFont typeface="Arial" panose="020B0604020202020204" pitchFamily="34" charset="0"/>
-              <a:buChar char="•"/>
-            </a:pPr>
-            <a:r>
-              <a:rPr lang="en-US" sz="2400" dirty="0" smtClean="0"/>
-              <a:t>Short learning curve – very easy to get started – fantastic documentation</a:t>
-            </a:r>
-          </a:p>
-          <a:p>
-            <a:pPr>
-              <a:buFont typeface="Arial" panose="020B0604020202020204" pitchFamily="34" charset="0"/>
-              <a:buChar char="•"/>
-            </a:pPr>
-            <a:r>
-              <a:rPr lang="en-US" sz="2400" dirty="0" smtClean="0"/>
-              <a:t>Focus on the data-binding</a:t>
-            </a:r>
-          </a:p>
-          <a:p>
-            <a:pPr>
-              <a:buFont typeface="Arial" panose="020B0604020202020204" pitchFamily="34" charset="0"/>
-              <a:buChar char="•"/>
-            </a:pPr>
-            <a:r>
-              <a:rPr lang="en-US" sz="2400" dirty="0" smtClean="0"/>
-              <a:t>Easily extendable</a:t>
-            </a:r>
-          </a:p>
-          <a:p>
-            <a:pPr lvl="1">
-              <a:buFont typeface="Arial" panose="020B0604020202020204" pitchFamily="34" charset="0"/>
-              <a:buChar char="•"/>
-            </a:pPr>
-            <a:r>
-              <a:rPr lang="en-US" sz="2400" dirty="0" err="1" smtClean="0"/>
-              <a:t>Templating</a:t>
-            </a:r>
-            <a:r>
-              <a:rPr lang="en-US" sz="2400" dirty="0" smtClean="0"/>
-              <a:t> – easy to plug in any major </a:t>
-            </a:r>
-            <a:r>
-              <a:rPr lang="en-US" sz="2400" dirty="0" err="1" smtClean="0"/>
-              <a:t>templating</a:t>
-            </a:r>
-            <a:r>
-              <a:rPr lang="en-US" sz="2400" dirty="0" smtClean="0"/>
-              <a:t> engine</a:t>
-            </a:r>
-          </a:p>
-          <a:p>
-            <a:pPr lvl="1">
-              <a:buFont typeface="Arial" panose="020B0604020202020204" pitchFamily="34" charset="0"/>
-              <a:buChar char="•"/>
-            </a:pPr>
-            <a:r>
-              <a:rPr lang="en-US" sz="2400" dirty="0" smtClean="0"/>
-              <a:t>Many plug-ins for common web activities such as model &lt;=&gt; JSON, validation</a:t>
-            </a:r>
-          </a:p>
-          <a:p>
-            <a:pPr>
-              <a:buFont typeface="Arial" panose="020B0604020202020204" pitchFamily="34" charset="0"/>
-              <a:buChar char="•"/>
-            </a:pPr>
-            <a:r>
-              <a:rPr lang="en-US" sz="2400" dirty="0" smtClean="0"/>
-              <a:t>Works well with other common tools such as Bootstrap, underscore, </a:t>
-            </a:r>
-            <a:r>
-              <a:rPr lang="en-US" sz="2400" dirty="0" err="1" smtClean="0"/>
-              <a:t>jQuery</a:t>
-            </a:r>
-            <a:endParaRPr lang="en-US" sz="2400" dirty="0" smtClean="0"/>
-          </a:p>
-          <a:p>
-            <a:pPr>
-              <a:buFont typeface="Arial" panose="020B0604020202020204" pitchFamily="34" charset="0"/>
-              <a:buChar char="•"/>
-            </a:pPr>
-            <a:r>
-              <a:rPr lang="en-US" sz="2400" dirty="0" smtClean="0"/>
-              <a:t>Clean separation between markup and JavaScript</a:t>
-            </a:r>
-          </a:p>
-          <a:p>
-            <a:pPr>
-              <a:buFont typeface="Arial" panose="020B0604020202020204" pitchFamily="34" charset="0"/>
-              <a:buChar char="•"/>
-            </a:pPr>
-            <a:r>
-              <a:rPr lang="en-US" sz="2400" dirty="0" smtClean="0"/>
-              <a:t>Easy to unit test</a:t>
-            </a:r>
-          </a:p>
-          <a:p>
-            <a:pPr lvl="1">
-              <a:buFont typeface="Arial" panose="020B0604020202020204" pitchFamily="34" charset="0"/>
-              <a:buChar char="•"/>
-            </a:pPr>
-            <a:endParaRPr lang="en-US" dirty="0"/>
+            <a:r>
+              <a:rPr lang="en-US" dirty="0" err="1" smtClean="0"/>
+              <a:t>jEnable</a:t>
+            </a:r>
+            <a:r>
+              <a:rPr lang="en-US" dirty="0"/>
+              <a:t>: </a:t>
+            </a:r>
+            <a:r>
+              <a:rPr lang="en-US" sz="1400" dirty="0" smtClean="0"/>
+              <a:t>(</a:t>
+            </a:r>
+            <a:r>
+              <a:rPr lang="en-US" sz="1400" dirty="0">
+                <a:hlinkClick r:id="rId2"/>
+              </a:rPr>
+              <a:t>http://codetype.wordpress.com/2011/10/21/enabledisable-jquery-buttons-in-knockout-with-a-custom-binding-handler</a:t>
+            </a:r>
+            <a:r>
+              <a:rPr lang="en-US" sz="1400" dirty="0" smtClean="0">
+                <a:hlinkClick r:id="rId2"/>
+              </a:rPr>
+              <a:t>/</a:t>
+            </a:r>
+            <a:r>
+              <a:rPr lang="en-US" sz="1400" dirty="0" smtClean="0"/>
+              <a:t>)</a:t>
+            </a:r>
+          </a:p>
+          <a:p>
+            <a:r>
+              <a:rPr lang="en-US" sz="1400" dirty="0">
+                <a:latin typeface="Consolas" panose="020B0609020204030204" pitchFamily="49" charset="0"/>
+                <a:cs typeface="Consolas" panose="020B0609020204030204" pitchFamily="49" charset="0"/>
+              </a:rPr>
+              <a:t>if (</a:t>
+            </a:r>
+            <a:r>
+              <a:rPr lang="en-US" sz="1400" dirty="0" err="1">
+                <a:latin typeface="Consolas" panose="020B0609020204030204" pitchFamily="49" charset="0"/>
+                <a:cs typeface="Consolas" panose="020B0609020204030204" pitchFamily="49" charset="0"/>
+              </a:rPr>
+              <a:t>ko</a:t>
+            </a:r>
+            <a:r>
+              <a:rPr lang="en-US" sz="1400" dirty="0">
+                <a:latin typeface="Consolas" panose="020B0609020204030204" pitchFamily="49" charset="0"/>
+                <a:cs typeface="Consolas" panose="020B0609020204030204" pitchFamily="49" charset="0"/>
+              </a:rPr>
+              <a:t> &amp;&amp; </a:t>
+            </a:r>
+            <a:r>
+              <a:rPr lang="en-US" sz="1400" dirty="0" err="1">
+                <a:latin typeface="Consolas" panose="020B0609020204030204" pitchFamily="49" charset="0"/>
+                <a:cs typeface="Consolas" panose="020B0609020204030204" pitchFamily="49" charset="0"/>
+              </a:rPr>
+              <a:t>ko.bindingHandlers</a:t>
+            </a:r>
+            <a:r>
+              <a:rPr lang="en-US" sz="1400" dirty="0">
+                <a:latin typeface="Consolas" panose="020B0609020204030204" pitchFamily="49" charset="0"/>
+                <a:cs typeface="Consolas" panose="020B0609020204030204" pitchFamily="49" charset="0"/>
+              </a:rPr>
+              <a:t>) </a:t>
+            </a:r>
+            <a:r>
+              <a:rPr lang="en-US" sz="1400" dirty="0" smtClean="0">
+                <a:latin typeface="Consolas" panose="020B0609020204030204" pitchFamily="49" charset="0"/>
+                <a:cs typeface="Consolas" panose="020B0609020204030204" pitchFamily="49" charset="0"/>
+              </a:rPr>
+              <a:t>{</a:t>
+            </a:r>
+            <a:br>
+              <a:rPr lang="en-US" sz="1400" dirty="0" smtClean="0">
+                <a:latin typeface="Consolas" panose="020B0609020204030204" pitchFamily="49" charset="0"/>
+                <a:cs typeface="Consolas" panose="020B0609020204030204" pitchFamily="49" charset="0"/>
+              </a:rPr>
+            </a:br>
+            <a:r>
+              <a:rPr lang="en-US" sz="1400" dirty="0" smtClean="0">
+                <a:latin typeface="Consolas" panose="020B0609020204030204" pitchFamily="49" charset="0"/>
+                <a:cs typeface="Consolas" panose="020B0609020204030204" pitchFamily="49" charset="0"/>
+              </a:rPr>
+              <a:t>    </a:t>
+            </a:r>
+            <a:r>
+              <a:rPr lang="en-US" sz="1400" dirty="0" err="1">
+                <a:latin typeface="Consolas" panose="020B0609020204030204" pitchFamily="49" charset="0"/>
+                <a:cs typeface="Consolas" panose="020B0609020204030204" pitchFamily="49" charset="0"/>
+              </a:rPr>
+              <a:t>ko.bindingHandlers</a:t>
+            </a:r>
+            <a:r>
+              <a:rPr lang="en-US" sz="1400" dirty="0">
+                <a:latin typeface="Consolas" panose="020B0609020204030204" pitchFamily="49" charset="0"/>
+                <a:cs typeface="Consolas" panose="020B0609020204030204" pitchFamily="49" charset="0"/>
+              </a:rPr>
+              <a:t>['</a:t>
+            </a:r>
+            <a:r>
+              <a:rPr lang="en-US" sz="1400" dirty="0" err="1">
+                <a:latin typeface="Consolas" panose="020B0609020204030204" pitchFamily="49" charset="0"/>
+                <a:cs typeface="Consolas" panose="020B0609020204030204" pitchFamily="49" charset="0"/>
+              </a:rPr>
+              <a:t>jEnable</a:t>
+            </a:r>
+            <a:r>
+              <a:rPr lang="en-US" sz="1400" dirty="0">
+                <a:latin typeface="Consolas" panose="020B0609020204030204" pitchFamily="49" charset="0"/>
+                <a:cs typeface="Consolas" panose="020B0609020204030204" pitchFamily="49" charset="0"/>
+              </a:rPr>
+              <a:t>'] = </a:t>
+            </a:r>
+            <a:r>
+              <a:rPr lang="en-US" sz="1400" dirty="0" smtClean="0">
+                <a:latin typeface="Consolas" panose="020B0609020204030204" pitchFamily="49" charset="0"/>
+                <a:cs typeface="Consolas" panose="020B0609020204030204" pitchFamily="49" charset="0"/>
+              </a:rPr>
+              <a:t>{</a:t>
+            </a:r>
+            <a:br>
+              <a:rPr lang="en-US" sz="1400" dirty="0" smtClean="0">
+                <a:latin typeface="Consolas" panose="020B0609020204030204" pitchFamily="49" charset="0"/>
+                <a:cs typeface="Consolas" panose="020B0609020204030204" pitchFamily="49" charset="0"/>
+              </a:rPr>
+            </a:br>
+            <a:r>
+              <a:rPr lang="en-US" sz="1400" dirty="0" smtClean="0">
+                <a:latin typeface="Consolas" panose="020B0609020204030204" pitchFamily="49" charset="0"/>
+                <a:cs typeface="Consolas" panose="020B0609020204030204" pitchFamily="49" charset="0"/>
+              </a:rPr>
+              <a:t>        </a:t>
+            </a:r>
+            <a:r>
+              <a:rPr lang="en-US" sz="1400" dirty="0">
+                <a:latin typeface="Consolas" panose="020B0609020204030204" pitchFamily="49" charset="0"/>
+                <a:cs typeface="Consolas" panose="020B0609020204030204" pitchFamily="49" charset="0"/>
+              </a:rPr>
+              <a:t>'update': function(element, </a:t>
+            </a:r>
+            <a:r>
+              <a:rPr lang="en-US" sz="1400" dirty="0" err="1">
+                <a:latin typeface="Consolas" panose="020B0609020204030204" pitchFamily="49" charset="0"/>
+                <a:cs typeface="Consolas" panose="020B0609020204030204" pitchFamily="49" charset="0"/>
+              </a:rPr>
+              <a:t>valueAccessor</a:t>
+            </a:r>
+            <a:r>
+              <a:rPr lang="en-US" sz="1400" dirty="0">
+                <a:latin typeface="Consolas" panose="020B0609020204030204" pitchFamily="49" charset="0"/>
+                <a:cs typeface="Consolas" panose="020B0609020204030204" pitchFamily="49" charset="0"/>
+              </a:rPr>
+              <a:t>) </a:t>
+            </a:r>
+            <a:r>
+              <a:rPr lang="en-US" sz="1400" dirty="0" smtClean="0">
+                <a:latin typeface="Consolas" panose="020B0609020204030204" pitchFamily="49" charset="0"/>
+                <a:cs typeface="Consolas" panose="020B0609020204030204" pitchFamily="49" charset="0"/>
+              </a:rPr>
+              <a:t>{</a:t>
+            </a:r>
+            <a:br>
+              <a:rPr lang="en-US" sz="1400" dirty="0" smtClean="0">
+                <a:latin typeface="Consolas" panose="020B0609020204030204" pitchFamily="49" charset="0"/>
+                <a:cs typeface="Consolas" panose="020B0609020204030204" pitchFamily="49" charset="0"/>
+              </a:rPr>
+            </a:br>
+            <a:r>
+              <a:rPr lang="en-US" sz="1400" dirty="0" smtClean="0">
+                <a:latin typeface="Consolas" panose="020B0609020204030204" pitchFamily="49" charset="0"/>
+                <a:cs typeface="Consolas" panose="020B0609020204030204" pitchFamily="49" charset="0"/>
+              </a:rPr>
+              <a:t>            </a:t>
+            </a:r>
+            <a:r>
+              <a:rPr lang="en-US" sz="1400" dirty="0" err="1">
+                <a:latin typeface="Consolas" panose="020B0609020204030204" pitchFamily="49" charset="0"/>
+                <a:cs typeface="Consolas" panose="020B0609020204030204" pitchFamily="49" charset="0"/>
+              </a:rPr>
+              <a:t>var</a:t>
+            </a:r>
+            <a:r>
+              <a:rPr lang="en-US" sz="1400" dirty="0">
+                <a:latin typeface="Consolas" panose="020B0609020204030204" pitchFamily="49" charset="0"/>
+                <a:cs typeface="Consolas" panose="020B0609020204030204" pitchFamily="49" charset="0"/>
+              </a:rPr>
+              <a:t> value = </a:t>
+            </a:r>
+            <a:r>
+              <a:rPr lang="en-US" sz="1400" dirty="0" err="1">
+                <a:latin typeface="Consolas" panose="020B0609020204030204" pitchFamily="49" charset="0"/>
+                <a:cs typeface="Consolas" panose="020B0609020204030204" pitchFamily="49" charset="0"/>
+              </a:rPr>
+              <a:t>ko.utils.unwrapObservable</a:t>
+            </a:r>
+            <a:r>
+              <a:rPr lang="en-US" sz="1400" dirty="0">
+                <a:latin typeface="Consolas" panose="020B0609020204030204" pitchFamily="49" charset="0"/>
+                <a:cs typeface="Consolas" panose="020B0609020204030204" pitchFamily="49" charset="0"/>
+              </a:rPr>
+              <a:t>(</a:t>
+            </a:r>
+            <a:r>
+              <a:rPr lang="en-US" sz="1400" dirty="0" err="1">
+                <a:latin typeface="Consolas" panose="020B0609020204030204" pitchFamily="49" charset="0"/>
+                <a:cs typeface="Consolas" panose="020B0609020204030204" pitchFamily="49" charset="0"/>
+              </a:rPr>
+              <a:t>valueAccessor</a:t>
+            </a:r>
+            <a:r>
+              <a:rPr lang="en-US" sz="1400" dirty="0" smtClean="0">
+                <a:latin typeface="Consolas" panose="020B0609020204030204" pitchFamily="49" charset="0"/>
+                <a:cs typeface="Consolas" panose="020B0609020204030204" pitchFamily="49" charset="0"/>
+              </a:rPr>
+              <a:t>());</a:t>
+            </a:r>
+            <a:br>
+              <a:rPr lang="en-US" sz="1400" dirty="0" smtClean="0">
+                <a:latin typeface="Consolas" panose="020B0609020204030204" pitchFamily="49" charset="0"/>
+                <a:cs typeface="Consolas" panose="020B0609020204030204" pitchFamily="49" charset="0"/>
+              </a:rPr>
+            </a:br>
+            <a:r>
+              <a:rPr lang="en-US" sz="1400" dirty="0" smtClean="0">
+                <a:latin typeface="Consolas" panose="020B0609020204030204" pitchFamily="49" charset="0"/>
+                <a:cs typeface="Consolas" panose="020B0609020204030204" pitchFamily="49" charset="0"/>
+              </a:rPr>
+              <a:t>            </a:t>
+            </a:r>
+            <a:r>
+              <a:rPr lang="en-US" sz="1400" dirty="0" err="1">
+                <a:latin typeface="Consolas" panose="020B0609020204030204" pitchFamily="49" charset="0"/>
+                <a:cs typeface="Consolas" panose="020B0609020204030204" pitchFamily="49" charset="0"/>
+              </a:rPr>
+              <a:t>var</a:t>
+            </a:r>
+            <a:r>
+              <a:rPr lang="en-US" sz="1400" dirty="0">
+                <a:latin typeface="Consolas" panose="020B0609020204030204" pitchFamily="49" charset="0"/>
+                <a:cs typeface="Consolas" panose="020B0609020204030204" pitchFamily="49" charset="0"/>
+              </a:rPr>
+              <a:t> $element = $(element</a:t>
+            </a:r>
+            <a:r>
+              <a:rPr lang="en-US" sz="1400" dirty="0" smtClean="0">
+                <a:latin typeface="Consolas" panose="020B0609020204030204" pitchFamily="49" charset="0"/>
+                <a:cs typeface="Consolas" panose="020B0609020204030204" pitchFamily="49" charset="0"/>
+              </a:rPr>
+              <a:t>);</a:t>
+            </a:r>
+            <a:br>
+              <a:rPr lang="en-US" sz="1400" dirty="0" smtClean="0">
+                <a:latin typeface="Consolas" panose="020B0609020204030204" pitchFamily="49" charset="0"/>
+                <a:cs typeface="Consolas" panose="020B0609020204030204" pitchFamily="49" charset="0"/>
+              </a:rPr>
+            </a:br>
+            <a:r>
+              <a:rPr lang="en-US" sz="1400" dirty="0" smtClean="0">
+                <a:latin typeface="Consolas" panose="020B0609020204030204" pitchFamily="49" charset="0"/>
+                <a:cs typeface="Consolas" panose="020B0609020204030204" pitchFamily="49" charset="0"/>
+              </a:rPr>
+              <a:t>            </a:t>
+            </a:r>
+            <a:r>
+              <a:rPr lang="en-US" sz="1400" dirty="0">
+                <a:latin typeface="Consolas" panose="020B0609020204030204" pitchFamily="49" charset="0"/>
+                <a:cs typeface="Consolas" panose="020B0609020204030204" pitchFamily="49" charset="0"/>
+              </a:rPr>
+              <a:t>$</a:t>
+            </a:r>
+            <a:r>
+              <a:rPr lang="en-US" sz="1400" dirty="0" err="1">
+                <a:latin typeface="Consolas" panose="020B0609020204030204" pitchFamily="49" charset="0"/>
+                <a:cs typeface="Consolas" panose="020B0609020204030204" pitchFamily="49" charset="0"/>
+              </a:rPr>
+              <a:t>element.prop</a:t>
+            </a:r>
+            <a:r>
+              <a:rPr lang="en-US" sz="1400" dirty="0">
+                <a:latin typeface="Consolas" panose="020B0609020204030204" pitchFamily="49" charset="0"/>
+                <a:cs typeface="Consolas" panose="020B0609020204030204" pitchFamily="49" charset="0"/>
+              </a:rPr>
+              <a:t>("disabled", !value</a:t>
+            </a:r>
+            <a:r>
+              <a:rPr lang="en-US" sz="1400" dirty="0" smtClean="0">
+                <a:latin typeface="Consolas" panose="020B0609020204030204" pitchFamily="49" charset="0"/>
+                <a:cs typeface="Consolas" panose="020B0609020204030204" pitchFamily="49" charset="0"/>
+              </a:rPr>
+              <a:t>);</a:t>
+            </a:r>
+            <a:br>
+              <a:rPr lang="en-US" sz="1400" dirty="0" smtClean="0">
+                <a:latin typeface="Consolas" panose="020B0609020204030204" pitchFamily="49" charset="0"/>
+                <a:cs typeface="Consolas" panose="020B0609020204030204" pitchFamily="49" charset="0"/>
+              </a:rPr>
+            </a:br>
+            <a:endParaRPr lang="en-US" sz="1400" dirty="0">
+              <a:latin typeface="Consolas" panose="020B0609020204030204" pitchFamily="49" charset="0"/>
+              <a:cs typeface="Consolas" panose="020B0609020204030204" pitchFamily="49" charset="0"/>
+            </a:endParaRPr>
+          </a:p>
+          <a:p>
+            <a:r>
+              <a:rPr lang="en-US" sz="1400" dirty="0">
+                <a:latin typeface="Consolas" panose="020B0609020204030204" pitchFamily="49" charset="0"/>
+                <a:cs typeface="Consolas" panose="020B0609020204030204" pitchFamily="49" charset="0"/>
+              </a:rPr>
+              <a:t>            if ($</a:t>
+            </a:r>
+            <a:r>
+              <a:rPr lang="en-US" sz="1400" dirty="0" err="1">
+                <a:latin typeface="Consolas" panose="020B0609020204030204" pitchFamily="49" charset="0"/>
+                <a:cs typeface="Consolas" panose="020B0609020204030204" pitchFamily="49" charset="0"/>
+              </a:rPr>
+              <a:t>element.hasClass</a:t>
+            </a:r>
+            <a:r>
+              <a:rPr lang="en-US" sz="1400" dirty="0">
+                <a:latin typeface="Consolas" panose="020B0609020204030204" pitchFamily="49" charset="0"/>
+                <a:cs typeface="Consolas" panose="020B0609020204030204" pitchFamily="49" charset="0"/>
+              </a:rPr>
+              <a:t>("</a:t>
+            </a:r>
+            <a:r>
+              <a:rPr lang="en-US" sz="1400" dirty="0" err="1">
+                <a:latin typeface="Consolas" panose="020B0609020204030204" pitchFamily="49" charset="0"/>
+                <a:cs typeface="Consolas" panose="020B0609020204030204" pitchFamily="49" charset="0"/>
+              </a:rPr>
+              <a:t>ui</a:t>
+            </a:r>
+            <a:r>
+              <a:rPr lang="en-US" sz="1400" dirty="0">
+                <a:latin typeface="Consolas" panose="020B0609020204030204" pitchFamily="49" charset="0"/>
+                <a:cs typeface="Consolas" panose="020B0609020204030204" pitchFamily="49" charset="0"/>
+              </a:rPr>
+              <a:t>-button")) </a:t>
+            </a:r>
+            <a:r>
+              <a:rPr lang="en-US" sz="1400" dirty="0" smtClean="0">
+                <a:latin typeface="Consolas" panose="020B0609020204030204" pitchFamily="49" charset="0"/>
+                <a:cs typeface="Consolas" panose="020B0609020204030204" pitchFamily="49" charset="0"/>
+              </a:rPr>
+              <a:t>{</a:t>
+            </a:r>
+            <a:br>
+              <a:rPr lang="en-US" sz="1400" dirty="0" smtClean="0">
+                <a:latin typeface="Consolas" panose="020B0609020204030204" pitchFamily="49" charset="0"/>
+                <a:cs typeface="Consolas" panose="020B0609020204030204" pitchFamily="49" charset="0"/>
+              </a:rPr>
+            </a:br>
+            <a:r>
+              <a:rPr lang="en-US" sz="1400" dirty="0" smtClean="0">
+                <a:latin typeface="Consolas" panose="020B0609020204030204" pitchFamily="49" charset="0"/>
+                <a:cs typeface="Consolas" panose="020B0609020204030204" pitchFamily="49" charset="0"/>
+              </a:rPr>
+              <a:t>                </a:t>
+            </a:r>
+            <a:r>
+              <a:rPr lang="en-US" sz="1400" dirty="0">
+                <a:latin typeface="Consolas" panose="020B0609020204030204" pitchFamily="49" charset="0"/>
+                <a:cs typeface="Consolas" panose="020B0609020204030204" pitchFamily="49" charset="0"/>
+              </a:rPr>
+              <a:t>$</a:t>
+            </a:r>
+            <a:r>
+              <a:rPr lang="en-US" sz="1400" dirty="0" err="1">
+                <a:latin typeface="Consolas" panose="020B0609020204030204" pitchFamily="49" charset="0"/>
+                <a:cs typeface="Consolas" panose="020B0609020204030204" pitchFamily="49" charset="0"/>
+              </a:rPr>
+              <a:t>element.button</a:t>
+            </a:r>
+            <a:r>
+              <a:rPr lang="en-US" sz="1400" dirty="0">
+                <a:latin typeface="Consolas" panose="020B0609020204030204" pitchFamily="49" charset="0"/>
+                <a:cs typeface="Consolas" panose="020B0609020204030204" pitchFamily="49" charset="0"/>
+              </a:rPr>
+              <a:t>("option", "disabled", !value</a:t>
+            </a:r>
+            <a:r>
+              <a:rPr lang="en-US" sz="1400" dirty="0" smtClean="0">
+                <a:latin typeface="Consolas" panose="020B0609020204030204" pitchFamily="49" charset="0"/>
+                <a:cs typeface="Consolas" panose="020B0609020204030204" pitchFamily="49" charset="0"/>
+              </a:rPr>
+              <a:t>);</a:t>
+            </a:r>
+            <a:br>
+              <a:rPr lang="en-US" sz="1400" dirty="0" smtClean="0">
+                <a:latin typeface="Consolas" panose="020B0609020204030204" pitchFamily="49" charset="0"/>
+                <a:cs typeface="Consolas" panose="020B0609020204030204" pitchFamily="49" charset="0"/>
+              </a:rPr>
+            </a:br>
+            <a:r>
+              <a:rPr lang="en-US" sz="1400" dirty="0" smtClean="0">
+                <a:latin typeface="Consolas" panose="020B0609020204030204" pitchFamily="49" charset="0"/>
+                <a:cs typeface="Consolas" panose="020B0609020204030204" pitchFamily="49" charset="0"/>
+              </a:rPr>
+              <a:t>            }</a:t>
+            </a:r>
+            <a:br>
+              <a:rPr lang="en-US" sz="1400" dirty="0" smtClean="0">
+                <a:latin typeface="Consolas" panose="020B0609020204030204" pitchFamily="49" charset="0"/>
+                <a:cs typeface="Consolas" panose="020B0609020204030204" pitchFamily="49" charset="0"/>
+              </a:rPr>
+            </a:br>
+            <a:r>
+              <a:rPr lang="en-US" sz="1400" dirty="0" smtClean="0">
+                <a:latin typeface="Consolas" panose="020B0609020204030204" pitchFamily="49" charset="0"/>
+                <a:cs typeface="Consolas" panose="020B0609020204030204" pitchFamily="49" charset="0"/>
+              </a:rPr>
+              <a:t>        }</a:t>
+            </a:r>
+            <a:br>
+              <a:rPr lang="en-US" sz="1400" dirty="0" smtClean="0">
+                <a:latin typeface="Consolas" panose="020B0609020204030204" pitchFamily="49" charset="0"/>
+                <a:cs typeface="Consolas" panose="020B0609020204030204" pitchFamily="49" charset="0"/>
+              </a:rPr>
+            </a:br>
+            <a:r>
+              <a:rPr lang="en-US" sz="1400" dirty="0" smtClean="0">
+                <a:latin typeface="Consolas" panose="020B0609020204030204" pitchFamily="49" charset="0"/>
+                <a:cs typeface="Consolas" panose="020B0609020204030204" pitchFamily="49" charset="0"/>
+              </a:rPr>
+              <a:t>    };</a:t>
+            </a:r>
+            <a:br>
+              <a:rPr lang="en-US" sz="1400" dirty="0" smtClean="0">
+                <a:latin typeface="Consolas" panose="020B0609020204030204" pitchFamily="49" charset="0"/>
+                <a:cs typeface="Consolas" panose="020B0609020204030204" pitchFamily="49" charset="0"/>
+              </a:rPr>
+            </a:br>
+            <a:r>
+              <a:rPr lang="en-US" sz="1400" dirty="0" smtClean="0">
+                <a:latin typeface="Consolas" panose="020B0609020204030204" pitchFamily="49" charset="0"/>
+                <a:cs typeface="Consolas" panose="020B0609020204030204" pitchFamily="49" charset="0"/>
+              </a:rPr>
+              <a:t>}</a:t>
+            </a:r>
+          </a:p>
+          <a:p>
+            <a:r>
+              <a:rPr lang="en-US" sz="1400" dirty="0">
+                <a:latin typeface="Consolas" panose="020B0609020204030204" pitchFamily="49" charset="0"/>
+                <a:cs typeface="Consolas" panose="020B0609020204030204" pitchFamily="49" charset="0"/>
+              </a:rPr>
+              <a:t>&lt;input id="</a:t>
+            </a:r>
+            <a:r>
+              <a:rPr lang="en-US" sz="1400" dirty="0" err="1">
+                <a:latin typeface="Consolas" panose="020B0609020204030204" pitchFamily="49" charset="0"/>
+                <a:cs typeface="Consolas" panose="020B0609020204030204" pitchFamily="49" charset="0"/>
+              </a:rPr>
+              <a:t>btnToEnable</a:t>
+            </a:r>
+            <a:r>
+              <a:rPr lang="en-US" sz="1400" dirty="0">
+                <a:latin typeface="Consolas" panose="020B0609020204030204" pitchFamily="49" charset="0"/>
+                <a:cs typeface="Consolas" panose="020B0609020204030204" pitchFamily="49" charset="0"/>
+              </a:rPr>
+              <a:t>" type="button" data-bind="</a:t>
+            </a:r>
+            <a:r>
+              <a:rPr lang="en-US" sz="1400" dirty="0" err="1">
+                <a:latin typeface="Consolas" panose="020B0609020204030204" pitchFamily="49" charset="0"/>
+                <a:cs typeface="Consolas" panose="020B0609020204030204" pitchFamily="49" charset="0"/>
+              </a:rPr>
+              <a:t>jEnable</a:t>
+            </a:r>
+            <a:r>
+              <a:rPr lang="en-US" sz="1400" dirty="0">
+                <a:latin typeface="Consolas" panose="020B0609020204030204" pitchFamily="49" charset="0"/>
+                <a:cs typeface="Consolas" panose="020B0609020204030204" pitchFamily="49" charset="0"/>
+              </a:rPr>
+              <a:t>: </a:t>
+            </a:r>
+            <a:r>
+              <a:rPr lang="en-US" sz="1400" dirty="0" err="1">
+                <a:latin typeface="Consolas" panose="020B0609020204030204" pitchFamily="49" charset="0"/>
+                <a:cs typeface="Consolas" panose="020B0609020204030204" pitchFamily="49" charset="0"/>
+              </a:rPr>
+              <a:t>isEnabled</a:t>
+            </a:r>
+            <a:r>
+              <a:rPr lang="en-US" sz="1400" dirty="0">
+                <a:latin typeface="Consolas" panose="020B0609020204030204" pitchFamily="49" charset="0"/>
+                <a:cs typeface="Consolas" panose="020B0609020204030204" pitchFamily="49" charset="0"/>
+              </a:rPr>
+              <a:t>" /&gt;</a:t>
+            </a:r>
+            <a:endParaRPr lang="en-US" sz="1400" dirty="0">
+              <a:latin typeface="Consolas" panose="020B0609020204030204" pitchFamily="49" charset="0"/>
+              <a:cs typeface="Consolas" panose="020B0609020204030204" pitchFamily="49" charset="0"/>
+            </a:endParaRPr>
+          </a:p>
+          <a:p>
+            <a:endParaRPr lang="en-US" sz="1400" dirty="0">
+              <a:latin typeface="Consolas" panose="020B0609020204030204" pitchFamily="49" charset="0"/>
+              <a:cs typeface="Consolas" panose="020B0609020204030204" pitchFamily="49" charset="0"/>
+            </a:endParaRPr>
           </a:p>
         </p:txBody>
       </p:sp>
     </p:spTree>
     <p:extLst>
       <p:ext uri="{BB962C8B-B14F-4D97-AF65-F5344CB8AC3E}">
-        <p14:creationId xmlns:p14="http://schemas.microsoft.com/office/powerpoint/2010/main" val="3551460069"/>
+        <p14:creationId xmlns:p14="http://schemas.microsoft.com/office/powerpoint/2010/main" val="1895176404"/>
       </p:ext>
     </p:extLst>
   </p:cSld>
@@ -4359,8 +4757,12 @@
           <a:lstStyle/>
           <a:p>
             <a:r>
+              <a:rPr lang="en-US" dirty="0"/>
+              <a:t>Extending KO.js</a:t>
+            </a:r>
+            <a:r>
               <a:rPr lang="en-US" dirty="0" smtClean="0"/>
-              <a:t>Knockout.js Cons</a:t>
+              <a:t>: Extenders</a:t>
             </a:r>
             <a:endParaRPr lang="en-US" dirty="0"/>
           </a:p>
@@ -4378,80 +4780,30 @@
         </p:nvSpPr>
         <p:spPr/>
         <p:txBody>
-          <a:bodyPr>
-            <a:normAutofit lnSpcReduction="10000"/>
-          </a:bodyPr>
-          <a:lstStyle/>
-          <a:p>
-            <a:pPr>
-              <a:buFont typeface="Arial" panose="020B0604020202020204" pitchFamily="34" charset="0"/>
-              <a:buChar char="•"/>
-            </a:pPr>
-            <a:r>
-              <a:rPr lang="en-US" sz="3200" dirty="0" smtClean="0"/>
-              <a:t>Is really just a data-binding library, not a full client-side framework.</a:t>
-            </a:r>
-          </a:p>
-          <a:p>
-            <a:pPr lvl="1">
-              <a:buFont typeface="Arial" panose="020B0604020202020204" pitchFamily="34" charset="0"/>
-              <a:buChar char="•"/>
-            </a:pPr>
-            <a:r>
-              <a:rPr lang="en-US" sz="3200" dirty="0" smtClean="0"/>
-              <a:t>No data save/update style functions built in</a:t>
-            </a:r>
-          </a:p>
-          <a:p>
-            <a:pPr lvl="1">
-              <a:buFont typeface="Arial" panose="020B0604020202020204" pitchFamily="34" charset="0"/>
-              <a:buChar char="•"/>
-            </a:pPr>
-            <a:r>
-              <a:rPr lang="en-US" sz="3200" dirty="0" smtClean="0"/>
-              <a:t>No hash-based routing</a:t>
-            </a:r>
-          </a:p>
-          <a:p>
-            <a:pPr>
-              <a:buFont typeface="Arial" panose="020B0604020202020204" pitchFamily="34" charset="0"/>
-              <a:buChar char="•"/>
-            </a:pPr>
-            <a:r>
-              <a:rPr lang="en-US" sz="3200" dirty="0" smtClean="0"/>
-              <a:t>Deep nesting and recursion of computed observables can cause performance issues.</a:t>
-            </a:r>
-          </a:p>
-          <a:p>
-            <a:pPr>
-              <a:buFont typeface="Arial" panose="020B0604020202020204" pitchFamily="34" charset="0"/>
-              <a:buChar char="•"/>
-            </a:pPr>
-            <a:r>
-              <a:rPr lang="en-US" sz="3200" dirty="0" smtClean="0"/>
-              <a:t>Data-binding information is stored in the markup, which can get large for very complicated pages.</a:t>
-            </a:r>
-          </a:p>
-          <a:p>
-            <a:pPr>
-              <a:buFont typeface="Arial" panose="020B0604020202020204" pitchFamily="34" charset="0"/>
-              <a:buChar char="•"/>
-            </a:pPr>
-            <a:endParaRPr lang="en-US" dirty="0" smtClean="0"/>
-          </a:p>
-          <a:p>
-            <a:pPr lvl="1">
-              <a:buFont typeface="Arial" panose="020B0604020202020204" pitchFamily="34" charset="0"/>
-              <a:buChar char="•"/>
-            </a:pPr>
-            <a:endParaRPr lang="en-US" dirty="0"/>
+          <a:bodyPr/>
+          <a:lstStyle/>
+          <a:p>
+            <a:r>
+              <a:rPr lang="en-US" dirty="0" smtClean="0"/>
+              <a:t>Allows custom methods to hang off of observables</a:t>
+            </a:r>
+          </a:p>
+          <a:p>
+            <a:r>
+              <a:rPr lang="en-US" dirty="0" err="1"/>
+              <a:t>ko.extenders.numeric</a:t>
+            </a:r>
+            <a:r>
+              <a:rPr lang="en-US" dirty="0"/>
+              <a:t> = function(target, precision) {</a:t>
+            </a:r>
           </a:p>
         </p:txBody>
       </p:sp>
     </p:spTree>
     <p:extLst>
       <p:ext uri="{BB962C8B-B14F-4D97-AF65-F5344CB8AC3E}">
-        <p14:creationId xmlns:p14="http://schemas.microsoft.com/office/powerpoint/2010/main" val="560940744"/>
+        <p14:creationId xmlns:p14="http://schemas.microsoft.com/office/powerpoint/2010/main" val="1321777339"/>
       </p:ext>
     </p:extLst>
   </p:cSld>
@@ -4493,7 +4845,11 @@
           <a:bodyPr/>
           <a:lstStyle/>
           <a:p>
-            <a:endParaRPr lang="en-US"/>
+            <a:r>
+              <a:rPr lang="en-US" dirty="0" smtClean="0"/>
+              <a:t>Knockout.js Pros</a:t>
+            </a:r>
+            <a:endParaRPr lang="en-US" dirty="0"/>
           </a:p>
         </p:txBody>
       </p:sp>
@@ -4509,17 +4865,255 @@
         </p:nvSpPr>
         <p:spPr/>
         <p:txBody>
-          <a:bodyPr/>
-          <a:lstStyle/>
-          <a:p>
-            <a:endParaRPr lang="en-US"/>
+          <a:bodyPr>
+            <a:normAutofit/>
+          </a:bodyPr>
+          <a:lstStyle/>
+          <a:p>
+            <a:pPr>
+              <a:buFont typeface="Arial" panose="020B0604020202020204" pitchFamily="34" charset="0"/>
+              <a:buChar char="•"/>
+            </a:pPr>
+            <a:r>
+              <a:rPr lang="en-US" sz="2400" dirty="0" smtClean="0"/>
+              <a:t>Short learning curve – very easy to get started – fantastic documentation</a:t>
+            </a:r>
+          </a:p>
+          <a:p>
+            <a:pPr>
+              <a:buFont typeface="Arial" panose="020B0604020202020204" pitchFamily="34" charset="0"/>
+              <a:buChar char="•"/>
+            </a:pPr>
+            <a:r>
+              <a:rPr lang="en-US" sz="2400" dirty="0" smtClean="0"/>
+              <a:t>Focus on the data-binding</a:t>
+            </a:r>
+          </a:p>
+          <a:p>
+            <a:pPr>
+              <a:buFont typeface="Arial" panose="020B0604020202020204" pitchFamily="34" charset="0"/>
+              <a:buChar char="•"/>
+            </a:pPr>
+            <a:r>
+              <a:rPr lang="en-US" sz="2400" dirty="0" smtClean="0"/>
+              <a:t>Easily extendable</a:t>
+            </a:r>
+          </a:p>
+          <a:p>
+            <a:pPr lvl="1">
+              <a:buFont typeface="Arial" panose="020B0604020202020204" pitchFamily="34" charset="0"/>
+              <a:buChar char="•"/>
+            </a:pPr>
+            <a:r>
+              <a:rPr lang="en-US" sz="2400" dirty="0" err="1" smtClean="0"/>
+              <a:t>Templating</a:t>
+            </a:r>
+            <a:r>
+              <a:rPr lang="en-US" sz="2400" dirty="0" smtClean="0"/>
+              <a:t> – easy to plug in any major </a:t>
+            </a:r>
+            <a:r>
+              <a:rPr lang="en-US" sz="2400" dirty="0" err="1" smtClean="0"/>
+              <a:t>templating</a:t>
+            </a:r>
+            <a:r>
+              <a:rPr lang="en-US" sz="2400" dirty="0" smtClean="0"/>
+              <a:t> engine</a:t>
+            </a:r>
+          </a:p>
+          <a:p>
+            <a:pPr lvl="1">
+              <a:buFont typeface="Arial" panose="020B0604020202020204" pitchFamily="34" charset="0"/>
+              <a:buChar char="•"/>
+            </a:pPr>
+            <a:r>
+              <a:rPr lang="en-US" sz="2400" dirty="0" smtClean="0"/>
+              <a:t>Many plug-ins for common web activities such as model &lt;=&gt; JSON, validation</a:t>
+            </a:r>
+          </a:p>
+          <a:p>
+            <a:pPr>
+              <a:buFont typeface="Arial" panose="020B0604020202020204" pitchFamily="34" charset="0"/>
+              <a:buChar char="•"/>
+            </a:pPr>
+            <a:r>
+              <a:rPr lang="en-US" sz="2400" dirty="0" smtClean="0"/>
+              <a:t>Works well with other common tools such as Bootstrap, underscore, </a:t>
+            </a:r>
+            <a:r>
+              <a:rPr lang="en-US" sz="2400" dirty="0" err="1" smtClean="0"/>
+              <a:t>jQuery</a:t>
+            </a:r>
+            <a:endParaRPr lang="en-US" sz="2400" dirty="0" smtClean="0"/>
+          </a:p>
+          <a:p>
+            <a:pPr>
+              <a:buFont typeface="Arial" panose="020B0604020202020204" pitchFamily="34" charset="0"/>
+              <a:buChar char="•"/>
+            </a:pPr>
+            <a:r>
+              <a:rPr lang="en-US" sz="2400" dirty="0" smtClean="0"/>
+              <a:t>Clean separation between markup and JavaScript</a:t>
+            </a:r>
+          </a:p>
+          <a:p>
+            <a:pPr>
+              <a:buFont typeface="Arial" panose="020B0604020202020204" pitchFamily="34" charset="0"/>
+              <a:buChar char="•"/>
+            </a:pPr>
+            <a:r>
+              <a:rPr lang="en-US" sz="2400" dirty="0" smtClean="0"/>
+              <a:t>Easy to unit test</a:t>
+            </a:r>
+          </a:p>
+          <a:p>
+            <a:pPr lvl="1">
+              <a:buFont typeface="Arial" panose="020B0604020202020204" pitchFamily="34" charset="0"/>
+              <a:buChar char="•"/>
+            </a:pPr>
+            <a:endParaRPr lang="en-US" dirty="0"/>
           </a:p>
         </p:txBody>
       </p:sp>
     </p:spTree>
     <p:extLst>
       <p:ext uri="{BB962C8B-B14F-4D97-AF65-F5344CB8AC3E}">
-        <p14:creationId xmlns:p14="http://schemas.microsoft.com/office/powerpoint/2010/main" val="1895176404"/>
+        <p14:creationId xmlns:p14="http://schemas.microsoft.com/office/powerpoint/2010/main" val="3551460069"/>
+      </p:ext>
+    </p:extLst>
+  </p:cSld>
+  <p:clrMapOvr>
+    <a:masterClrMapping/>
+  </p:clrMapOvr>
+</p:sld>
+</file>
+
+<file path=ppt/slides/slide8.xml><?xml version="1.0" encoding="utf-8"?>
+<p:sld xmlns:a="http://schemas.openxmlformats.org/drawingml/2006/main" xmlns:r="http://schemas.openxmlformats.org/officeDocument/2006/relationships" xmlns:p="http://schemas.openxmlformats.org/presentationml/2006/main">
+  <p:cSld>
+    <p:spTree>
+      <p:nvGrpSpPr>
+        <p:cNvPr id="1" name=""/>
+        <p:cNvGrpSpPr/>
+        <p:nvPr/>
+      </p:nvGrpSpPr>
+      <p:grpSpPr>
+        <a:xfrm>
+          <a:off x="0" y="0"/>
+          <a:ext cx="0" cy="0"/>
+          <a:chOff x="0" y="0"/>
+          <a:chExt cx="0" cy="0"/>
+        </a:xfrm>
+      </p:grpSpPr>
+      <p:sp>
+        <p:nvSpPr>
+          <p:cNvPr id="2" name="Title 1"/>
+          <p:cNvSpPr>
+            <a:spLocks noGrp="1"/>
+          </p:cNvSpPr>
+          <p:nvPr>
+            <p:ph type="title"/>
+          </p:nvPr>
+        </p:nvSpPr>
+        <p:spPr/>
+        <p:txBody>
+          <a:bodyPr/>
+          <a:lstStyle/>
+          <a:p>
+            <a:r>
+              <a:rPr lang="en-US" dirty="0" smtClean="0"/>
+              <a:t>Knockout.js Cons</a:t>
+            </a:r>
+            <a:endParaRPr lang="en-US" dirty="0"/>
+          </a:p>
+        </p:txBody>
+      </p:sp>
+      <p:sp>
+        <p:nvSpPr>
+          <p:cNvPr id="3" name="Content Placeholder 2"/>
+          <p:cNvSpPr>
+            <a:spLocks noGrp="1"/>
+          </p:cNvSpPr>
+          <p:nvPr>
+            <p:ph idx="1"/>
+          </p:nvPr>
+        </p:nvSpPr>
+        <p:spPr/>
+        <p:txBody>
+          <a:bodyPr>
+            <a:normAutofit lnSpcReduction="10000"/>
+          </a:bodyPr>
+          <a:lstStyle/>
+          <a:p>
+            <a:pPr>
+              <a:buFont typeface="Arial" panose="020B0604020202020204" pitchFamily="34" charset="0"/>
+              <a:buChar char="•"/>
+            </a:pPr>
+            <a:r>
+              <a:rPr lang="en-US" sz="3200" dirty="0" smtClean="0"/>
+              <a:t>Is really just a data-binding library, not a full client-side framework.</a:t>
+            </a:r>
+          </a:p>
+          <a:p>
+            <a:pPr lvl="1">
+              <a:buFont typeface="Arial" panose="020B0604020202020204" pitchFamily="34" charset="0"/>
+              <a:buChar char="•"/>
+            </a:pPr>
+            <a:r>
+              <a:rPr lang="en-US" sz="3200" dirty="0" smtClean="0"/>
+              <a:t>No data save/update style functions built in</a:t>
+            </a:r>
+          </a:p>
+          <a:p>
+            <a:pPr lvl="1">
+              <a:buFont typeface="Arial" panose="020B0604020202020204" pitchFamily="34" charset="0"/>
+              <a:buChar char="•"/>
+            </a:pPr>
+            <a:r>
+              <a:rPr lang="en-US" sz="3200" dirty="0" smtClean="0"/>
+              <a:t>No hash-based routing</a:t>
+            </a:r>
+          </a:p>
+          <a:p>
+            <a:pPr>
+              <a:buFont typeface="Arial" panose="020B0604020202020204" pitchFamily="34" charset="0"/>
+              <a:buChar char="•"/>
+            </a:pPr>
+            <a:r>
+              <a:rPr lang="en-US" sz="3200" dirty="0" smtClean="0"/>
+              <a:t>Deep nesting and recursion of computed observables can cause performance issues.</a:t>
+            </a:r>
+          </a:p>
+          <a:p>
+            <a:pPr>
+              <a:buFont typeface="Arial" panose="020B0604020202020204" pitchFamily="34" charset="0"/>
+              <a:buChar char="•"/>
+            </a:pPr>
+            <a:r>
+              <a:rPr lang="en-US" sz="3200" dirty="0" smtClean="0"/>
+              <a:t>Data-binding information is stored in the markup, which can get large for very complicated pages.</a:t>
+            </a:r>
+          </a:p>
+          <a:p>
+            <a:pPr>
+              <a:buFont typeface="Arial" panose="020B0604020202020204" pitchFamily="34" charset="0"/>
+              <a:buChar char="•"/>
+            </a:pPr>
+            <a:endParaRPr lang="en-US" dirty="0" smtClean="0"/>
+          </a:p>
+          <a:p>
+            <a:pPr lvl="1">
+              <a:buFont typeface="Arial" panose="020B0604020202020204" pitchFamily="34" charset="0"/>
+              <a:buChar char="•"/>
+            </a:pPr>
+            <a:endParaRPr lang="en-US" dirty="0"/>
+          </a:p>
+        </p:txBody>
+      </p:sp>
+    </p:spTree>
+    <p:extLst>
+      <p:ext uri="{BB962C8B-B14F-4D97-AF65-F5344CB8AC3E}">
+        <p14:creationId xmlns:p14="http://schemas.microsoft.com/office/powerpoint/2010/main" val="560940744"/>
       </p:ext>
     </p:extLst>
   </p:cSld>

</xml_diff>

<commit_message>
Updated title page of slides
</commit_message>
<xml_diff>
--- a/Knockout.pptx
+++ b/Knockout.pptx
@@ -345,7 +345,7 @@
           <a:p>
             <a:fld id="{5A069CB8-F204-4D06-B913-C5A26A89888A}" type="datetimeFigureOut">
               <a:rPr lang="en-US" dirty="0"/>
-              <a:t>2/18/2013</a:t>
+              <a:t>2/19/2013</a:t>
             </a:fld>
             <a:endParaRPr lang="en-US" dirty="0"/>
           </a:p>
@@ -548,7 +548,7 @@
           <a:p>
             <a:fld id="{50B6E300-0A13-4A81-945A-7333C271A069}" type="datetimeFigureOut">
               <a:rPr lang="en-US" dirty="0"/>
-              <a:t>2/18/2013</a:t>
+              <a:t>2/19/2013</a:t>
             </a:fld>
             <a:endParaRPr lang="en-US" dirty="0"/>
           </a:p>
@@ -799,7 +799,7 @@
           <a:p>
             <a:fld id="{34671962-1EA4-46E7-BCB0-F36CE46D1A59}" type="datetimeFigureOut">
               <a:rPr lang="en-US" dirty="0"/>
-              <a:t>2/18/2013</a:t>
+              <a:t>2/19/2013</a:t>
             </a:fld>
             <a:endParaRPr lang="en-US" dirty="0"/>
           </a:p>
@@ -964,7 +964,7 @@
           <a:p>
             <a:fld id="{D30BB376-B19C-488D-ABEB-03C7E6E9E3E0}" type="datetimeFigureOut">
               <a:rPr lang="en-US" dirty="0"/>
-              <a:t>2/18/2013</a:t>
+              <a:t>2/19/2013</a:t>
             </a:fld>
             <a:endParaRPr lang="en-US" dirty="0"/>
           </a:p>
@@ -1302,7 +1302,7 @@
           <a:p>
             <a:fld id="{486F077B-A50F-4D64-8574-E2D6A98A5553}" type="datetimeFigureOut">
               <a:rPr lang="en-US" dirty="0"/>
-              <a:t>2/18/2013</a:t>
+              <a:t>2/19/2013</a:t>
             </a:fld>
             <a:endParaRPr lang="en-US" dirty="0"/>
           </a:p>
@@ -1572,7 +1572,7 @@
           <a:p>
             <a:fld id="{7D9E2A62-1983-43A1-A163-D8AA46534C80}" type="datetimeFigureOut">
               <a:rPr lang="en-US" dirty="0"/>
-              <a:t>2/18/2013</a:t>
+              <a:t>2/19/2013</a:t>
             </a:fld>
             <a:endParaRPr lang="en-US" dirty="0"/>
           </a:p>
@@ -1946,7 +1946,7 @@
           <a:p>
             <a:fld id="{898F3E3B-34E3-4345-B2A1-994B83598A9C}" type="datetimeFigureOut">
               <a:rPr lang="en-US" dirty="0"/>
-              <a:t>2/18/2013</a:t>
+              <a:t>2/19/2013</a:t>
             </a:fld>
             <a:endParaRPr lang="en-US" dirty="0"/>
           </a:p>
@@ -2059,7 +2059,7 @@
           <a:p>
             <a:fld id="{FD816C96-82A1-4D77-8ADA-627AC6FE3D65}" type="datetimeFigureOut">
               <a:rPr lang="en-US" dirty="0"/>
-              <a:t>2/18/2013</a:t>
+              <a:t>2/19/2013</a:t>
             </a:fld>
             <a:endParaRPr lang="en-US" dirty="0"/>
           </a:p>
@@ -2225,7 +2225,7 @@
           <a:p>
             <a:fld id="{1D102C1E-28F2-47E9-802D-339E64E2F920}" type="datetimeFigureOut">
               <a:rPr lang="en-US" dirty="0"/>
-              <a:t>2/18/2013</a:t>
+              <a:t>2/19/2013</a:t>
             </a:fld>
             <a:endParaRPr lang="en-US" dirty="0"/>
           </a:p>
@@ -2575,7 +2575,7 @@
           <a:p>
             <a:fld id="{24271A48-F18A-45B3-BC05-1E27DA3F88AF}" type="datetimeFigureOut">
               <a:rPr lang="en-US" dirty="0"/>
-              <a:t>2/18/2013</a:t>
+              <a:t>2/19/2013</a:t>
             </a:fld>
             <a:endParaRPr lang="en-US" dirty="0"/>
           </a:p>
@@ -2948,7 +2948,7 @@
           <a:p>
             <a:fld id="{65B747F8-9654-4282-85D2-65F41AAE7A75}" type="datetimeFigureOut">
               <a:rPr lang="en-US" dirty="0"/>
-              <a:t>2/18/2013</a:t>
+              <a:t>2/19/2013</a:t>
             </a:fld>
             <a:endParaRPr lang="en-US" dirty="0"/>
           </a:p>
@@ -3230,7 +3230,7 @@
           <a:p>
             <a:fld id="{5DC5B261-8843-42D1-AAFC-05E20E2D9B97}" type="datetimeFigureOut">
               <a:rPr lang="en-US" dirty="0"/>
-              <a:t>2/18/2013</a:t>
+              <a:t>2/19/2013</a:t>
             </a:fld>
             <a:endParaRPr lang="en-US" dirty="0"/>
           </a:p>
@@ -3786,12 +3786,31 @@
         </p:nvSpPr>
         <p:spPr/>
         <p:txBody>
-          <a:bodyPr/>
-          <a:lstStyle/>
+          <a:bodyPr>
+            <a:normAutofit fontScale="85000" lnSpcReduction="20000"/>
+          </a:bodyPr>
+          <a:lstStyle/>
+          <a:p>
+            <a:r>
+              <a:rPr lang="en-US" sz="2800" dirty="0" smtClean="0"/>
+              <a:t>The Other JAVASCRIPT MV* </a:t>
+            </a:r>
+            <a:r>
+              <a:rPr lang="en-US" sz="2800" dirty="0" smtClean="0"/>
+              <a:t>framework</a:t>
+            </a:r>
+          </a:p>
+          <a:p>
+            <a:endParaRPr lang="en-US" dirty="0"/>
+          </a:p>
           <a:p>
             <a:r>
               <a:rPr lang="en-US" dirty="0" smtClean="0"/>
-              <a:t>The Other JAVASCRIPT MV* framework</a:t>
+              <a:t>Joe Doyle - @</a:t>
+            </a:r>
+            <a:r>
+              <a:rPr lang="en-US" smtClean="0"/>
+              <a:t>JoeDoyle23 – http://joedoyle.us</a:t>
             </a:r>
             <a:endParaRPr lang="en-US" dirty="0"/>
           </a:p>
@@ -4698,10 +4717,6 @@
               </a:rPr>
               <a:t>" /&gt;</a:t>
             </a:r>
-            <a:endParaRPr lang="en-US" sz="1400" dirty="0">
-              <a:latin typeface="Consolas" panose="020B0609020204030204" pitchFamily="49" charset="0"/>
-              <a:cs typeface="Consolas" panose="020B0609020204030204" pitchFamily="49" charset="0"/>
-            </a:endParaRPr>
           </a:p>
           <a:p>
             <a:endParaRPr lang="en-US" sz="1400" dirty="0">

</xml_diff>

<commit_message>
Updated the slides and readme
</commit_message>
<xml_diff>
--- a/Knockout.pptx
+++ b/Knockout.pptx
@@ -113,7 +113,7 @@
   </p:defaultTextStyle>
   <p:extLst>
     <p:ext uri="{EFAFB233-063F-42B5-8137-9DF3F51BA10A}">
-      <p15:sldGuideLst xmlns:p15="http://schemas.microsoft.com/office/powerpoint/2012/main"/>
+      <p15:sldGuideLst xmlns="" xmlns:p15="http://schemas.microsoft.com/office/powerpoint/2012/main"/>
     </p:ext>
   </p:extLst>
 </p:presentation>
@@ -345,7 +345,7 @@
           <a:p>
             <a:fld id="{5A069CB8-F204-4D06-B913-C5A26A89888A}" type="datetimeFigureOut">
               <a:rPr lang="en-US" dirty="0"/>
-              <a:t>2/19/2013</a:t>
+              <a:t>2/20/2013</a:t>
             </a:fld>
             <a:endParaRPr lang="en-US" dirty="0"/>
           </a:p>
@@ -548,7 +548,7 @@
           <a:p>
             <a:fld id="{50B6E300-0A13-4A81-945A-7333C271A069}" type="datetimeFigureOut">
               <a:rPr lang="en-US" dirty="0"/>
-              <a:t>2/19/2013</a:t>
+              <a:t>2/20/2013</a:t>
             </a:fld>
             <a:endParaRPr lang="en-US" dirty="0"/>
           </a:p>
@@ -799,7 +799,7 @@
           <a:p>
             <a:fld id="{34671962-1EA4-46E7-BCB0-F36CE46D1A59}" type="datetimeFigureOut">
               <a:rPr lang="en-US" dirty="0"/>
-              <a:t>2/19/2013</a:t>
+              <a:t>2/20/2013</a:t>
             </a:fld>
             <a:endParaRPr lang="en-US" dirty="0"/>
           </a:p>
@@ -964,7 +964,7 @@
           <a:p>
             <a:fld id="{D30BB376-B19C-488D-ABEB-03C7E6E9E3E0}" type="datetimeFigureOut">
               <a:rPr lang="en-US" dirty="0"/>
-              <a:t>2/19/2013</a:t>
+              <a:t>2/20/2013</a:t>
             </a:fld>
             <a:endParaRPr lang="en-US" dirty="0"/>
           </a:p>
@@ -1302,7 +1302,7 @@
           <a:p>
             <a:fld id="{486F077B-A50F-4D64-8574-E2D6A98A5553}" type="datetimeFigureOut">
               <a:rPr lang="en-US" dirty="0"/>
-              <a:t>2/19/2013</a:t>
+              <a:t>2/20/2013</a:t>
             </a:fld>
             <a:endParaRPr lang="en-US" dirty="0"/>
           </a:p>
@@ -1572,7 +1572,7 @@
           <a:p>
             <a:fld id="{7D9E2A62-1983-43A1-A163-D8AA46534C80}" type="datetimeFigureOut">
               <a:rPr lang="en-US" dirty="0"/>
-              <a:t>2/19/2013</a:t>
+              <a:t>2/20/2013</a:t>
             </a:fld>
             <a:endParaRPr lang="en-US" dirty="0"/>
           </a:p>
@@ -1946,7 +1946,7 @@
           <a:p>
             <a:fld id="{898F3E3B-34E3-4345-B2A1-994B83598A9C}" type="datetimeFigureOut">
               <a:rPr lang="en-US" dirty="0"/>
-              <a:t>2/19/2013</a:t>
+              <a:t>2/20/2013</a:t>
             </a:fld>
             <a:endParaRPr lang="en-US" dirty="0"/>
           </a:p>
@@ -2059,7 +2059,7 @@
           <a:p>
             <a:fld id="{FD816C96-82A1-4D77-8ADA-627AC6FE3D65}" type="datetimeFigureOut">
               <a:rPr lang="en-US" dirty="0"/>
-              <a:t>2/19/2013</a:t>
+              <a:t>2/20/2013</a:t>
             </a:fld>
             <a:endParaRPr lang="en-US" dirty="0"/>
           </a:p>
@@ -2225,7 +2225,7 @@
           <a:p>
             <a:fld id="{1D102C1E-28F2-47E9-802D-339E64E2F920}" type="datetimeFigureOut">
               <a:rPr lang="en-US" dirty="0"/>
-              <a:t>2/19/2013</a:t>
+              <a:t>2/20/2013</a:t>
             </a:fld>
             <a:endParaRPr lang="en-US" dirty="0"/>
           </a:p>
@@ -2575,7 +2575,7 @@
           <a:p>
             <a:fld id="{24271A48-F18A-45B3-BC05-1E27DA3F88AF}" type="datetimeFigureOut">
               <a:rPr lang="en-US" dirty="0"/>
-              <a:t>2/19/2013</a:t>
+              <a:t>2/20/2013</a:t>
             </a:fld>
             <a:endParaRPr lang="en-US" dirty="0"/>
           </a:p>
@@ -2948,7 +2948,7 @@
           <a:p>
             <a:fld id="{65B747F8-9654-4282-85D2-65F41AAE7A75}" type="datetimeFigureOut">
               <a:rPr lang="en-US" dirty="0"/>
-              <a:t>2/19/2013</a:t>
+              <a:t>2/20/2013</a:t>
             </a:fld>
             <a:endParaRPr lang="en-US" dirty="0"/>
           </a:p>
@@ -3230,7 +3230,7 @@
           <a:p>
             <a:fld id="{5DC5B261-8843-42D1-AAFC-05E20E2D9B97}" type="datetimeFigureOut">
               <a:rPr lang="en-US" dirty="0"/>
-              <a:t>2/19/2013</a:t>
+              <a:t>2/20/2013</a:t>
             </a:fld>
             <a:endParaRPr lang="en-US" dirty="0"/>
           </a:p>
@@ -3793,11 +3793,7 @@
           <a:p>
             <a:r>
               <a:rPr lang="en-US" sz="2800" dirty="0" smtClean="0"/>
-              <a:t>The Other JAVASCRIPT MV* </a:t>
-            </a:r>
-            <a:r>
-              <a:rPr lang="en-US" sz="2800" dirty="0" smtClean="0"/>
-              <a:t>framework</a:t>
+              <a:t>The Other JAVASCRIPT MV* framework</a:t>
             </a:r>
           </a:p>
           <a:p>
@@ -3826,6 +3822,13 @@
   <p:clrMapOvr>
     <a:masterClrMapping/>
   </p:clrMapOvr>
+  <p:timing>
+    <p:tnLst>
+      <p:par>
+        <p:cTn id="1" dur="indefinite" restart="never" nodeType="tmRoot"/>
+      </p:par>
+    </p:tnLst>
+  </p:timing>
 </p:sld>
 </file>
 
@@ -3890,8 +3893,17 @@
             </a:pPr>
             <a:r>
               <a:rPr lang="en-US" sz="2400" dirty="0" smtClean="0"/>
-              <a:t>An MVVM client-side JavaScript library</a:t>
-            </a:r>
+              <a:t>An MVVM client-side JavaScript </a:t>
+            </a:r>
+            <a:r>
+              <a:rPr lang="en-US" sz="2400" dirty="0" smtClean="0"/>
+              <a:t>library created by </a:t>
+            </a:r>
+            <a:r>
+              <a:rPr lang="en-US" sz="2400" smtClean="0"/>
+              <a:t>Steve Sanderson</a:t>
+            </a:r>
+            <a:endParaRPr lang="en-US" sz="2400" dirty="0" smtClean="0"/>
           </a:p>
           <a:p>
             <a:pPr>
@@ -3918,7 +3930,15 @@
             </a:r>
             <a:r>
               <a:rPr lang="en-US" sz="2400" dirty="0"/>
-              <a:t> - a simple and obvious way to connect parts of your UI to your data model. You can construct a complex dynamic UIs easily using arbitrarily nested binding contexts.</a:t>
+              <a:t> - a simple and obvious way to connect parts of your UI to your data model. You can construct </a:t>
+            </a:r>
+            <a:r>
+              <a:rPr lang="en-US" sz="2400" dirty="0" smtClean="0"/>
+              <a:t>complex and </a:t>
+            </a:r>
+            <a:r>
+              <a:rPr lang="en-US" sz="2400" dirty="0"/>
+              <a:t>dynamic UIs easily using arbitrarily nested binding contexts.</a:t>
             </a:r>
           </a:p>
           <a:p>
@@ -3964,6 +3984,13 @@
   <p:clrMapOvr>
     <a:masterClrMapping/>
   </p:clrMapOvr>
+  <p:timing>
+    <p:tnLst>
+      <p:par>
+        <p:cTn id="1" dur="indefinite" restart="never" nodeType="tmRoot"/>
+      </p:par>
+    </p:tnLst>
+  </p:timing>
 </p:sld>
 </file>
 
@@ -4084,6 +4111,13 @@
   <p:clrMapOvr>
     <a:masterClrMapping/>
   </p:clrMapOvr>
+  <p:timing>
+    <p:tnLst>
+      <p:par>
+        <p:cTn id="1" dur="indefinite" restart="never" nodeType="tmRoot"/>
+      </p:par>
+    </p:tnLst>
+  </p:timing>
 </p:sld>
 </file>
 
@@ -4168,6 +4202,13 @@
   <p:clrMapOvr>
     <a:masterClrMapping/>
   </p:clrMapOvr>
+  <p:timing>
+    <p:tnLst>
+      <p:par>
+        <p:cTn id="1" dur="indefinite" restart="never" nodeType="tmRoot"/>
+      </p:par>
+    </p:tnLst>
+  </p:timing>
 </p:sld>
 </file>
 
@@ -4233,9 +4274,20 @@
               <a:t>jEnable</a:t>
             </a:r>
             <a:r>
+              <a:rPr lang="en-US" dirty="0" smtClean="0"/>
+              <a:t> by </a:t>
+            </a:r>
+            <a:r>
               <a:rPr lang="en-US" dirty="0"/>
-              <a:t>: </a:t>
-            </a:r>
+              <a:t>Matt Blair</a:t>
+            </a:r>
+            <a:r>
+              <a:rPr lang="en-US" dirty="0" smtClean="0"/>
+              <a:t>:</a:t>
+            </a:r>
+            <a:br>
+              <a:rPr lang="en-US" dirty="0" smtClean="0"/>
+            </a:br>
             <a:r>
               <a:rPr lang="en-US" sz="1400" dirty="0" smtClean="0"/>
               <a:t>(</a:t>
@@ -4736,6 +4788,13 @@
   <p:clrMapOvr>
     <a:masterClrMapping/>
   </p:clrMapOvr>
+  <p:timing>
+    <p:tnLst>
+      <p:par>
+        <p:cTn id="1" dur="indefinite" restart="never" nodeType="tmRoot"/>
+      </p:par>
+    </p:tnLst>
+  </p:timing>
 </p:sld>
 </file>
 
@@ -4800,17 +4859,81 @@
           <a:p>
             <a:r>
               <a:rPr lang="en-US" dirty="0" smtClean="0"/>
-              <a:t>Allows custom methods to hang off of observables</a:t>
-            </a:r>
-          </a:p>
-          <a:p>
-            <a:r>
-              <a:rPr lang="en-US" dirty="0" err="1"/>
-              <a:t>ko.extenders.numeric</a:t>
-            </a:r>
-            <a:r>
-              <a:rPr lang="en-US" dirty="0"/>
-              <a:t> = function(target, precision) {</a:t>
+              <a:t>Allows custom methods to hang off of observables.</a:t>
+            </a:r>
+          </a:p>
+          <a:p>
+            <a:r>
+              <a:rPr lang="en-US" dirty="0" smtClean="0"/>
+              <a:t>A common one we use is </a:t>
+            </a:r>
+            <a:r>
+              <a:rPr lang="en-US" b="1" dirty="0"/>
+              <a:t>Knockout </a:t>
+            </a:r>
+            <a:r>
+              <a:rPr lang="en-US" b="1" dirty="0" smtClean="0"/>
+              <a:t>Validation</a:t>
+            </a:r>
+            <a:r>
+              <a:rPr lang="en-US" dirty="0" smtClean="0"/>
+              <a:t> by Eric Bernard which adds form validation to observables and can update the form elements to display the error CSS and messages</a:t>
+            </a:r>
+          </a:p>
+          <a:p>
+            <a:endParaRPr lang="en-US" sz="1600" dirty="0" smtClean="0">
+              <a:latin typeface="Consolas" pitchFamily="49" charset="0"/>
+              <a:cs typeface="Consolas" pitchFamily="49" charset="0"/>
+            </a:endParaRPr>
+          </a:p>
+          <a:p>
+            <a:r>
+              <a:rPr lang="en-US" sz="1600" dirty="0" err="1" smtClean="0">
+                <a:latin typeface="Consolas" pitchFamily="49" charset="0"/>
+                <a:cs typeface="Consolas" pitchFamily="49" charset="0"/>
+              </a:rPr>
+              <a:t>emailAddress</a:t>
+            </a:r>
+            <a:r>
+              <a:rPr lang="en-US" sz="1600" dirty="0" smtClean="0">
+                <a:latin typeface="Consolas" pitchFamily="49" charset="0"/>
+                <a:cs typeface="Consolas" pitchFamily="49" charset="0"/>
+              </a:rPr>
+              <a:t> = </a:t>
+            </a:r>
+            <a:r>
+              <a:rPr lang="en-US" sz="1600" dirty="0" err="1" smtClean="0">
+                <a:latin typeface="Consolas" pitchFamily="49" charset="0"/>
+                <a:cs typeface="Consolas" pitchFamily="49" charset="0"/>
+              </a:rPr>
+              <a:t>ko.observable</a:t>
+            </a:r>
+            <a:r>
+              <a:rPr lang="en-US" sz="1600" dirty="0" smtClean="0">
+                <a:latin typeface="Consolas" pitchFamily="49" charset="0"/>
+                <a:cs typeface="Consolas" pitchFamily="49" charset="0"/>
+              </a:rPr>
+              <a:t>();</a:t>
+            </a:r>
+            <a:br>
+              <a:rPr lang="en-US" sz="1600" dirty="0" smtClean="0">
+                <a:latin typeface="Consolas" pitchFamily="49" charset="0"/>
+                <a:cs typeface="Consolas" pitchFamily="49" charset="0"/>
+              </a:rPr>
+            </a:br>
+            <a:r>
+              <a:rPr lang="en-US" sz="1600" dirty="0" err="1" smtClean="0">
+                <a:latin typeface="Consolas" pitchFamily="49" charset="0"/>
+                <a:cs typeface="Consolas" pitchFamily="49" charset="0"/>
+              </a:rPr>
+              <a:t>emailAddress.extend</a:t>
+            </a:r>
+            <a:r>
+              <a:rPr lang="en-US" sz="1600" dirty="0">
+                <a:latin typeface="Consolas" pitchFamily="49" charset="0"/>
+                <a:cs typeface="Consolas" pitchFamily="49" charset="0"/>
+              </a:rPr>
+              <a:t>({ required: { message: "Please enter your email address"} });</a:t>
             </a:r>
           </a:p>
         </p:txBody>
@@ -4825,6 +4948,13 @@
   <p:clrMapOvr>
     <a:masterClrMapping/>
   </p:clrMapOvr>
+  <p:timing>
+    <p:tnLst>
+      <p:par>
+        <p:cTn id="1" dur="indefinite" restart="never" nodeType="tmRoot"/>
+      </p:par>
+    </p:tnLst>
+  </p:timing>
 </p:sld>
 </file>
 
@@ -4900,8 +5030,8 @@
               <a:buChar char="•"/>
             </a:pPr>
             <a:r>
-              <a:rPr lang="en-US" sz="2400" dirty="0" smtClean="0"/>
-              <a:t>Focus on the data-binding</a:t>
+              <a:rPr lang="en-US" sz="2400" dirty="0"/>
+              <a:t>Clean separation between markup and JavaScript</a:t>
             </a:r>
           </a:p>
           <a:p>
@@ -4911,6 +5041,26 @@
             </a:pPr>
             <a:r>
               <a:rPr lang="en-US" sz="2400" dirty="0" smtClean="0"/>
+              <a:t>Focus on the data-binding</a:t>
+            </a:r>
+          </a:p>
+          <a:p>
+            <a:pPr>
+              <a:buFont typeface="Arial" panose="020B0604020202020204" pitchFamily="34" charset="0"/>
+              <a:buChar char="•"/>
+            </a:pPr>
+            <a:r>
+              <a:rPr lang="en-US" sz="2400" dirty="0"/>
+              <a:t>Works well with other common tools such as Bootstrap, underscore, jQuery</a:t>
+            </a:r>
+          </a:p>
+          <a:p>
+            <a:pPr>
+              <a:buFont typeface="Arial" panose="020B0604020202020204" pitchFamily="34" charset="0"/>
+              <a:buChar char="•"/>
+            </a:pPr>
+            <a:r>
+              <a:rPr lang="en-US" sz="2400" dirty="0" smtClean="0"/>
               <a:t>Easily extendable</a:t>
             </a:r>
           </a:p>
@@ -4944,31 +5094,6 @@
             <a:r>
               <a:rPr lang="en-US" sz="2400" dirty="0" smtClean="0"/>
               <a:t>Many plug-ins for common web activities such as model &lt;=&gt; JSON, validation</a:t>
-            </a:r>
-          </a:p>
-          <a:p>
-            <a:pPr>
-              <a:buFont typeface="Arial" panose="020B0604020202020204" pitchFamily="34" charset="0"/>
-              <a:buChar char="•"/>
-            </a:pPr>
-            <a:r>
-              <a:rPr lang="en-US" sz="2400" dirty="0" smtClean="0"/>
-              <a:t>Works well with other common tools such as Bootstrap, underscore, </a:t>
-            </a:r>
-            <a:r>
-              <a:rPr lang="en-US" sz="2400" dirty="0" err="1" smtClean="0"/>
-              <a:t>jQuery</a:t>
-            </a:r>
-            <a:endParaRPr lang="en-US" sz="2400" dirty="0" smtClean="0"/>
-          </a:p>
-          <a:p>
-            <a:pPr>
-              <a:buFont typeface="Arial" panose="020B0604020202020204" pitchFamily="34" charset="0"/>
-              <a:buChar char="•"/>
-            </a:pPr>
-            <a:r>
-              <a:rPr lang="en-US" sz="2400" dirty="0" smtClean="0"/>
-              <a:t>Clean separation between markup and JavaScript</a:t>
             </a:r>
           </a:p>
           <a:p>
@@ -5000,6 +5125,13 @@
   <p:clrMapOvr>
     <a:masterClrMapping/>
   </p:clrMapOvr>
+  <p:timing>
+    <p:tnLst>
+      <p:par>
+        <p:cTn id="1" dur="indefinite" restart="never" nodeType="tmRoot"/>
+      </p:par>
+    </p:tnLst>
+  </p:timing>
 </p:sld>
 </file>
 
@@ -5056,7 +5188,7 @@
         <p:spPr/>
         <p:txBody>
           <a:bodyPr>
-            <a:normAutofit lnSpcReduction="10000"/>
+            <a:normAutofit/>
           </a:bodyPr>
           <a:lstStyle/>
           <a:p>
@@ -5065,7 +5197,7 @@
               <a:buChar char="•"/>
             </a:pPr>
             <a:r>
-              <a:rPr lang="en-US" sz="3200" dirty="0" smtClean="0"/>
+              <a:rPr lang="en-US" sz="2400" dirty="0" smtClean="0"/>
               <a:t>Is really just a data-binding library, not a full client-side framework.</a:t>
             </a:r>
           </a:p>
@@ -5075,7 +5207,7 @@
               <a:buChar char="•"/>
             </a:pPr>
             <a:r>
-              <a:rPr lang="en-US" sz="3200" dirty="0" smtClean="0"/>
+              <a:rPr lang="en-US" sz="2400" dirty="0" smtClean="0"/>
               <a:t>No data save/update style functions built in</a:t>
             </a:r>
           </a:p>
@@ -5085,7 +5217,7 @@
               <a:buChar char="•"/>
             </a:pPr>
             <a:r>
-              <a:rPr lang="en-US" sz="3200" dirty="0" smtClean="0"/>
+              <a:rPr lang="en-US" sz="2400" dirty="0" smtClean="0"/>
               <a:t>No hash-based routing</a:t>
             </a:r>
           </a:p>
@@ -5095,8 +5227,8 @@
               <a:buChar char="•"/>
             </a:pPr>
             <a:r>
-              <a:rPr lang="en-US" sz="3200" dirty="0" smtClean="0"/>
-              <a:t>Deep nesting and recursion of computed observables can cause performance issues.</a:t>
+              <a:rPr lang="en-US" sz="2400" dirty="0"/>
+              <a:t>Data-binding information is stored in the markup, which can get large for very complicated pages.</a:t>
             </a:r>
           </a:p>
           <a:p>
@@ -5105,8 +5237,8 @@
               <a:buChar char="•"/>
             </a:pPr>
             <a:r>
-              <a:rPr lang="en-US" sz="3200" dirty="0" smtClean="0"/>
-              <a:t>Data-binding information is stored in the markup, which can get large for very complicated pages.</a:t>
+              <a:rPr lang="en-US" sz="2400" dirty="0" smtClean="0"/>
+              <a:t>Deep nesting and recursion of computed observables can cause performance issues.</a:t>
             </a:r>
           </a:p>
           <a:p>
@@ -5135,6 +5267,13 @@
   <p:clrMapOvr>
     <a:masterClrMapping/>
   </p:clrMapOvr>
+  <p:timing>
+    <p:tnLst>
+      <p:par>
+        <p:cTn id="1" dur="indefinite" restart="never" nodeType="tmRoot"/>
+      </p:par>
+    </p:tnLst>
+  </p:timing>
 </p:sld>
 </file>
 
@@ -5181,7 +5320,7 @@
     </a:clrScheme>
     <a:fontScheme name="Retrospect">
       <a:majorFont>
-        <a:latin typeface="Calibri Light" panose="020F0302020204030204"/>
+        <a:latin typeface="Calibri Light"/>
         <a:ea typeface=""/>
         <a:cs typeface=""/>
         <a:font script="Jpan" typeface="ＭＳ Ｐゴシック"/>
@@ -5216,7 +5355,7 @@
         <a:font script="Geor" typeface="Sylfaen"/>
       </a:majorFont>
       <a:minorFont>
-        <a:latin typeface="Calibri" panose="020F0502020204030204"/>
+        <a:latin typeface="Calibri"/>
         <a:ea typeface=""/>
         <a:cs typeface=""/>
         <a:font script="Jpan" typeface="ＭＳ Ｐゴシック"/>
@@ -5415,7 +5554,7 @@
   <a:extraClrSchemeLst/>
   <a:extLst>
     <a:ext uri="{05A4C25C-085E-4340-85A3-A5531E510DB2}">
-      <thm15:themeFamily xmlns:thm15="http://schemas.microsoft.com/office/thememl/2012/main" name="Retrospect" id="{5F128B03-DCCA-4EEB-AB3B-CF2899314A46}" vid="{02006FA4-1611-4B07-AF7F-85CF6D20EB3E}"/>
+      <thm15:themeFamily xmlns="" xmlns:thm15="http://schemas.microsoft.com/office/thememl/2012/main" name="Retrospect" id="{5F128B03-DCCA-4EEB-AB3B-CF2899314A46}" vid="{02006FA4-1611-4B07-AF7F-85CF6D20EB3E}"/>
     </a:ext>
   </a:extLst>
 </a:theme>

</xml_diff>